<commit_message>
ajout de la date
</commit_message>
<xml_diff>
--- a/Soutenance Projet 9.pptx
+++ b/Soutenance Projet 9.pptx
@@ -302,7 +302,7 @@
           <a:p>
             <a:fld id="{2400229A-390B-4886-878D-DF4DFBA38E23}" type="datetimeFigureOut">
               <a:rPr lang="fr-FR" smtClean="0"/>
-              <a:t>08/05/2019</a:t>
+              <a:t>05/06/2019</a:t>
             </a:fld>
             <a:endParaRPr lang="fr-FR"/>
           </a:p>
@@ -467,7 +467,7 @@
           <a:p>
             <a:fld id="{2400229A-390B-4886-878D-DF4DFBA38E23}" type="datetimeFigureOut">
               <a:rPr lang="fr-FR" smtClean="0"/>
-              <a:t>08/05/2019</a:t>
+              <a:t>05/06/2019</a:t>
             </a:fld>
             <a:endParaRPr lang="fr-FR"/>
           </a:p>
@@ -642,7 +642,7 @@
           <a:p>
             <a:fld id="{2400229A-390B-4886-878D-DF4DFBA38E23}" type="datetimeFigureOut">
               <a:rPr lang="fr-FR" smtClean="0"/>
-              <a:t>08/05/2019</a:t>
+              <a:t>05/06/2019</a:t>
             </a:fld>
             <a:endParaRPr lang="fr-FR"/>
           </a:p>
@@ -807,7 +807,7 @@
           <a:p>
             <a:fld id="{2400229A-390B-4886-878D-DF4DFBA38E23}" type="datetimeFigureOut">
               <a:rPr lang="fr-FR" smtClean="0"/>
-              <a:t>08/05/2019</a:t>
+              <a:t>05/06/2019</a:t>
             </a:fld>
             <a:endParaRPr lang="fr-FR"/>
           </a:p>
@@ -1048,7 +1048,7 @@
           <a:p>
             <a:fld id="{2400229A-390B-4886-878D-DF4DFBA38E23}" type="datetimeFigureOut">
               <a:rPr lang="fr-FR" smtClean="0"/>
-              <a:t>08/05/2019</a:t>
+              <a:t>05/06/2019</a:t>
             </a:fld>
             <a:endParaRPr lang="fr-FR"/>
           </a:p>
@@ -1331,7 +1331,7 @@
           <a:p>
             <a:fld id="{2400229A-390B-4886-878D-DF4DFBA38E23}" type="datetimeFigureOut">
               <a:rPr lang="fr-FR" smtClean="0"/>
-              <a:t>08/05/2019</a:t>
+              <a:t>05/06/2019</a:t>
             </a:fld>
             <a:endParaRPr lang="fr-FR"/>
           </a:p>
@@ -1760,7 +1760,7 @@
           <a:p>
             <a:fld id="{2400229A-390B-4886-878D-DF4DFBA38E23}" type="datetimeFigureOut">
               <a:rPr lang="fr-FR" smtClean="0"/>
-              <a:t>08/05/2019</a:t>
+              <a:t>05/06/2019</a:t>
             </a:fld>
             <a:endParaRPr lang="fr-FR"/>
           </a:p>
@@ -1873,7 +1873,7 @@
           <a:p>
             <a:fld id="{2400229A-390B-4886-878D-DF4DFBA38E23}" type="datetimeFigureOut">
               <a:rPr lang="fr-FR" smtClean="0"/>
-              <a:t>08/05/2019</a:t>
+              <a:t>05/06/2019</a:t>
             </a:fld>
             <a:endParaRPr lang="fr-FR"/>
           </a:p>
@@ -1963,7 +1963,7 @@
           <a:p>
             <a:fld id="{2400229A-390B-4886-878D-DF4DFBA38E23}" type="datetimeFigureOut">
               <a:rPr lang="fr-FR" smtClean="0"/>
-              <a:t>08/05/2019</a:t>
+              <a:t>05/06/2019</a:t>
             </a:fld>
             <a:endParaRPr lang="fr-FR"/>
           </a:p>
@@ -2152,7 +2152,7 @@
           <a:p>
             <a:fld id="{2400229A-390B-4886-878D-DF4DFBA38E23}" type="datetimeFigureOut">
               <a:rPr lang="fr-FR" smtClean="0"/>
-              <a:t>08/05/2019</a:t>
+              <a:t>05/06/2019</a:t>
             </a:fld>
             <a:endParaRPr lang="fr-FR"/>
           </a:p>
@@ -2470,7 +2470,7 @@
           <a:p>
             <a:fld id="{2400229A-390B-4886-878D-DF4DFBA38E23}" type="datetimeFigureOut">
               <a:rPr lang="fr-FR" smtClean="0"/>
-              <a:t>08/05/2019</a:t>
+              <a:t>05/06/2019</a:t>
             </a:fld>
             <a:endParaRPr lang="fr-FR"/>
           </a:p>
@@ -2849,7 +2849,7 @@
           <a:p>
             <a:fld id="{2400229A-390B-4886-878D-DF4DFBA38E23}" type="datetimeFigureOut">
               <a:rPr lang="fr-FR" smtClean="0"/>
-              <a:t>08/05/2019</a:t>
+              <a:t>05/06/2019</a:t>
             </a:fld>
             <a:endParaRPr lang="fr-FR"/>
           </a:p>
@@ -3189,11 +3189,7 @@
           <a:p>
             <a:r>
               <a:rPr lang="fr-FR" dirty="0" smtClean="0"/>
-              <a:t>Soutenance Projet </a:t>
-            </a:r>
-            <a:r>
-              <a:rPr lang="fr-FR" dirty="0" smtClean="0"/>
-              <a:t>9</a:t>
+              <a:t>Soutenance Projet 9</a:t>
             </a:r>
             <a:endParaRPr lang="fr-FR" dirty="0"/>
           </a:p>
@@ -3232,12 +3228,8 @@
           </a:p>
           <a:p>
             <a:r>
-              <a:rPr lang="fr-FR" sz="2400" dirty="0"/>
-              <a:t>xx/</a:t>
-            </a:r>
-            <a:r>
               <a:rPr lang="fr-FR" sz="2400" dirty="0" smtClean="0"/>
-              <a:t>xx/2019</a:t>
+              <a:t>15/06/2019</a:t>
             </a:r>
             <a:endParaRPr lang="fr-FR" sz="2400" dirty="0"/>
           </a:p>
@@ -3322,7 +3314,6 @@
               <a:rPr lang="fr-FR" dirty="0" smtClean="0"/>
               <a:t>Contexte</a:t>
             </a:r>
-            <a:endParaRPr lang="fr-FR" dirty="0" smtClean="0"/>
           </a:p>
           <a:p>
             <a:r>
@@ -3336,7 +3327,6 @@
               <a:rPr lang="fr-FR" dirty="0" smtClean="0"/>
               <a:t>PV de livraison</a:t>
             </a:r>
-            <a:endParaRPr lang="fr-FR" dirty="0" smtClean="0"/>
           </a:p>
           <a:p>
             <a:endParaRPr lang="fr-FR" dirty="0" smtClean="0"/>

</xml_diff>